<commit_message>
consumo activo vs pasivo
</commit_message>
<xml_diff>
--- a/assets/docs/controles-parentales.pptx
+++ b/assets/docs/controles-parentales.pptx
@@ -12948,7 +12948,7 @@
           <a:p>
             <a:fld id="{31F24B76-8555-014E-AC98-46E7A6AC312A}" type="datetimeFigureOut">
               <a:rPr lang="es-ES_tradnl" smtClean="0"/>
-              <a:t>23/7/25</a:t>
+              <a:t>4/8/25</a:t>
             </a:fld>
             <a:endParaRPr lang="es-ES_tradnl"/>
           </a:p>
@@ -13631,7 +13631,7 @@
           <a:p>
             <a:fld id="{877BB5C5-8194-EF4D-B111-3317B019E8B0}" type="datetimeFigureOut">
               <a:rPr lang="es-ES_tradnl" smtClean="0"/>
-              <a:t>23/7/25</a:t>
+              <a:t>4/8/25</a:t>
             </a:fld>
             <a:endParaRPr lang="es-ES_tradnl"/>
           </a:p>
@@ -13955,7 +13955,7 @@
           <a:p>
             <a:fld id="{877BB5C5-8194-EF4D-B111-3317B019E8B0}" type="datetimeFigureOut">
               <a:rPr lang="es-ES_tradnl" smtClean="0"/>
-              <a:t>23/7/25</a:t>
+              <a:t>4/8/25</a:t>
             </a:fld>
             <a:endParaRPr lang="es-ES_tradnl"/>
           </a:p>
@@ -14203,7 +14203,7 @@
           <a:p>
             <a:fld id="{877BB5C5-8194-EF4D-B111-3317B019E8B0}" type="datetimeFigureOut">
               <a:rPr lang="es-ES_tradnl" smtClean="0"/>
-              <a:t>23/7/25</a:t>
+              <a:t>4/8/25</a:t>
             </a:fld>
             <a:endParaRPr lang="es-ES_tradnl"/>
           </a:p>
@@ -14542,7 +14542,7 @@
           <a:p>
             <a:fld id="{877BB5C5-8194-EF4D-B111-3317B019E8B0}" type="datetimeFigureOut">
               <a:rPr lang="es-ES_tradnl" smtClean="0"/>
-              <a:t>23/7/25</a:t>
+              <a:t>4/8/25</a:t>
             </a:fld>
             <a:endParaRPr lang="es-ES_tradnl"/>
           </a:p>
@@ -14889,7 +14889,7 @@
           <a:p>
             <a:fld id="{877BB5C5-8194-EF4D-B111-3317B019E8B0}" type="datetimeFigureOut">
               <a:rPr lang="es-ES_tradnl" smtClean="0"/>
-              <a:t>23/7/25</a:t>
+              <a:t>4/8/25</a:t>
             </a:fld>
             <a:endParaRPr lang="es-ES_tradnl"/>
           </a:p>
@@ -15263,7 +15263,7 @@
           <a:p>
             <a:fld id="{877BB5C5-8194-EF4D-B111-3317B019E8B0}" type="datetimeFigureOut">
               <a:rPr lang="es-ES_tradnl" smtClean="0"/>
-              <a:t>23/7/25</a:t>
+              <a:t>4/8/25</a:t>
             </a:fld>
             <a:endParaRPr lang="es-ES_tradnl"/>
           </a:p>
@@ -15733,7 +15733,7 @@
           <a:p>
             <a:fld id="{877BB5C5-8194-EF4D-B111-3317B019E8B0}" type="datetimeFigureOut">
               <a:rPr lang="es-ES_tradnl" smtClean="0"/>
-              <a:t>23/7/25</a:t>
+              <a:t>4/8/25</a:t>
             </a:fld>
             <a:endParaRPr lang="es-ES_tradnl"/>
           </a:p>
@@ -15938,7 +15938,7 @@
           <a:p>
             <a:fld id="{877BB5C5-8194-EF4D-B111-3317B019E8B0}" type="datetimeFigureOut">
               <a:rPr lang="es-ES_tradnl" smtClean="0"/>
-              <a:t>23/7/25</a:t>
+              <a:t>4/8/25</a:t>
             </a:fld>
             <a:endParaRPr lang="es-ES_tradnl"/>
           </a:p>
@@ -16149,7 +16149,7 @@
           <a:p>
             <a:fld id="{877BB5C5-8194-EF4D-B111-3317B019E8B0}" type="datetimeFigureOut">
               <a:rPr lang="es-ES_tradnl" smtClean="0"/>
-              <a:t>23/7/25</a:t>
+              <a:t>4/8/25</a:t>
             </a:fld>
             <a:endParaRPr lang="es-ES_tradnl"/>
           </a:p>
@@ -16381,7 +16381,7 @@
           <a:p>
             <a:fld id="{877BB5C5-8194-EF4D-B111-3317B019E8B0}" type="datetimeFigureOut">
               <a:rPr lang="es-ES_tradnl" smtClean="0"/>
-              <a:t>23/7/25</a:t>
+              <a:t>4/8/25</a:t>
             </a:fld>
             <a:endParaRPr lang="es-ES_tradnl"/>
           </a:p>
@@ -16629,7 +16629,7 @@
           <a:p>
             <a:fld id="{877BB5C5-8194-EF4D-B111-3317B019E8B0}" type="datetimeFigureOut">
               <a:rPr lang="es-ES_tradnl" smtClean="0"/>
-              <a:t>23/7/25</a:t>
+              <a:t>4/8/25</a:t>
             </a:fld>
             <a:endParaRPr lang="es-ES_tradnl"/>
           </a:p>
@@ -16927,7 +16927,7 @@
           <a:p>
             <a:fld id="{877BB5C5-8194-EF4D-B111-3317B019E8B0}" type="datetimeFigureOut">
               <a:rPr lang="es-ES_tradnl" smtClean="0"/>
-              <a:t>23/7/25</a:t>
+              <a:t>4/8/25</a:t>
             </a:fld>
             <a:endParaRPr lang="es-ES_tradnl"/>
           </a:p>
@@ -17321,7 +17321,7 @@
           <a:p>
             <a:fld id="{877BB5C5-8194-EF4D-B111-3317B019E8B0}" type="datetimeFigureOut">
               <a:rPr lang="es-ES_tradnl" smtClean="0"/>
-              <a:t>23/7/25</a:t>
+              <a:t>4/8/25</a:t>
             </a:fld>
             <a:endParaRPr lang="es-ES_tradnl"/>
           </a:p>
@@ -17470,7 +17470,7 @@
           <a:p>
             <a:fld id="{877BB5C5-8194-EF4D-B111-3317B019E8B0}" type="datetimeFigureOut">
               <a:rPr lang="es-ES_tradnl" smtClean="0"/>
-              <a:t>23/7/25</a:t>
+              <a:t>4/8/25</a:t>
             </a:fld>
             <a:endParaRPr lang="es-ES_tradnl"/>
           </a:p>
@@ -17596,7 +17596,7 @@
           <a:p>
             <a:fld id="{877BB5C5-8194-EF4D-B111-3317B019E8B0}" type="datetimeFigureOut">
               <a:rPr lang="es-ES_tradnl" smtClean="0"/>
-              <a:t>23/7/25</a:t>
+              <a:t>4/8/25</a:t>
             </a:fld>
             <a:endParaRPr lang="es-ES_tradnl"/>
           </a:p>
@@ -17851,7 +17851,7 @@
           <a:p>
             <a:fld id="{877BB5C5-8194-EF4D-B111-3317B019E8B0}" type="datetimeFigureOut">
               <a:rPr lang="es-ES_tradnl" smtClean="0"/>
-              <a:t>23/7/25</a:t>
+              <a:t>4/8/25</a:t>
             </a:fld>
             <a:endParaRPr lang="es-ES_tradnl"/>
           </a:p>
@@ -18166,7 +18166,7 @@
           <a:p>
             <a:fld id="{877BB5C5-8194-EF4D-B111-3317B019E8B0}" type="datetimeFigureOut">
               <a:rPr lang="es-ES_tradnl" smtClean="0"/>
-              <a:t>23/7/25</a:t>
+              <a:t>4/8/25</a:t>
             </a:fld>
             <a:endParaRPr lang="es-ES_tradnl"/>
           </a:p>
@@ -18517,7 +18517,7 @@
           <a:p>
             <a:fld id="{877BB5C5-8194-EF4D-B111-3317B019E8B0}" type="datetimeFigureOut">
               <a:rPr lang="es-ES_tradnl" smtClean="0"/>
-              <a:t>23/7/25</a:t>
+              <a:t>4/8/25</a:t>
             </a:fld>
             <a:endParaRPr lang="es-ES_tradnl"/>
           </a:p>
@@ -22062,8 +22062,8 @@
         </p:nvSpPr>
         <p:spPr>
           <a:xfrm>
-            <a:off x="1295401" y="2556932"/>
-            <a:ext cx="9601196" cy="3318936"/>
+            <a:off x="1295401" y="1267147"/>
+            <a:ext cx="9628238" cy="3816129"/>
           </a:xfrm>
         </p:spPr>
         <p:txBody>
@@ -22113,27 +22113,42 @@
               <a:buChar char="ü"/>
             </a:pPr>
             <a:r>
-              <a:rPr lang="es-ES_tradnl" sz="1600" dirty="0">
+              <a:rPr lang="es-ES_tradnl" sz="2000" dirty="0">
                 <a:solidFill>
                   <a:srgbClr val="FFFFFF"/>
                 </a:solidFill>
                 <a:latin typeface="Consolas" panose="020B0609020204030204" pitchFamily="49" charset="0"/>
                 <a:cs typeface="Consolas" panose="020B0609020204030204" pitchFamily="49" charset="0"/>
               </a:rPr>
-              <a:t>Mas recursos disponibles en https://</a:t>
+              <a:t>Mas recursos disponibles en:</a:t>
             </a:r>
+          </a:p>
+          <a:p>
+            <a:pPr marL="0" indent="0">
+              <a:buNone/>
+            </a:pPr>
             <a:r>
-              <a:rPr lang="es-ES_tradnl" sz="1600" dirty="0" err="1">
+              <a:rPr lang="es-ES_tradnl" sz="2000" dirty="0">
                 <a:solidFill>
                   <a:srgbClr val="FFFFFF"/>
                 </a:solidFill>
                 <a:latin typeface="Consolas" panose="020B0609020204030204" pitchFamily="49" charset="0"/>
                 <a:cs typeface="Consolas" panose="020B0609020204030204" pitchFamily="49" charset="0"/>
               </a:rPr>
-              <a:t>github.com</a:t>
+              <a:t> https://</a:t>
             </a:r>
             <a:r>
-              <a:rPr lang="es-ES_tradnl" sz="1600" dirty="0">
+              <a:rPr lang="es-ES_tradnl" sz="2000" dirty="0" err="1">
+                <a:solidFill>
+                  <a:srgbClr val="FFFFFF"/>
+                </a:solidFill>
+                <a:latin typeface="Consolas" panose="020B0609020204030204" pitchFamily="49" charset="0"/>
+                <a:cs typeface="Consolas" panose="020B0609020204030204" pitchFamily="49" charset="0"/>
+              </a:rPr>
+              <a:t>walalapancho.github.io</a:t>
+            </a:r>
+            <a:r>
+              <a:rPr lang="es-ES_tradnl" sz="2000" dirty="0">
                 <a:solidFill>
                   <a:srgbClr val="FFFFFF"/>
                 </a:solidFill>
@@ -22143,17 +22158,17 @@
               <a:t>/</a:t>
             </a:r>
             <a:r>
-              <a:rPr lang="es-ES_tradnl" sz="1600" dirty="0" err="1">
+              <a:rPr lang="es-ES_tradnl" sz="2000" dirty="0" err="1">
                 <a:solidFill>
                   <a:srgbClr val="FFFFFF"/>
                 </a:solidFill>
                 <a:latin typeface="Consolas" panose="020B0609020204030204" pitchFamily="49" charset="0"/>
                 <a:cs typeface="Consolas" panose="020B0609020204030204" pitchFamily="49" charset="0"/>
               </a:rPr>
-              <a:t>walalapancho</a:t>
+              <a:t>GuiaParaPadres</a:t>
             </a:r>
             <a:r>
-              <a:rPr lang="es-ES_tradnl" sz="1600" dirty="0">
+              <a:rPr lang="es-ES_tradnl" sz="2000" dirty="0">
                 <a:solidFill>
                   <a:srgbClr val="FFFFFF"/>
                 </a:solidFill>
@@ -22162,23 +22177,6 @@
               </a:rPr>
               <a:t>/</a:t>
             </a:r>
-            <a:r>
-              <a:rPr lang="es-ES_tradnl" sz="1600" dirty="0" err="1">
-                <a:solidFill>
-                  <a:srgbClr val="FFFFFF"/>
-                </a:solidFill>
-                <a:latin typeface="Consolas" panose="020B0609020204030204" pitchFamily="49" charset="0"/>
-                <a:cs typeface="Consolas" panose="020B0609020204030204" pitchFamily="49" charset="0"/>
-              </a:rPr>
-              <a:t>GuiaParaPadres</a:t>
-            </a:r>
-            <a:endParaRPr lang="es-ES_tradnl" sz="1600" dirty="0">
-              <a:solidFill>
-                <a:srgbClr val="FFFFFF"/>
-              </a:solidFill>
-              <a:latin typeface="Consolas" panose="020B0609020204030204" pitchFamily="49" charset="0"/>
-              <a:cs typeface="Consolas" panose="020B0609020204030204" pitchFamily="49" charset="0"/>
-            </a:endParaRPr>
           </a:p>
         </p:txBody>
       </p:sp>

</xml_diff>